<commit_message>
Updated Header Ratio and Design
</commit_message>
<xml_diff>
--- a/docs/images/Logos.pptx
+++ b/docs/images/Logos.pptx
@@ -261,7 +261,7 @@
           <a:p>
             <a:fld id="{CFA7E1E1-1AED-45C9-ACD5-3100DF9D7791}" type="datetimeFigureOut">
               <a:rPr lang="en-US" smtClean="0"/>
-              <a:t>4/9/2024</a:t>
+              <a:t>4/25/24</a:t>
             </a:fld>
             <a:endParaRPr lang="en-US"/>
           </a:p>
@@ -459,7 +459,7 @@
           <a:p>
             <a:fld id="{CFA7E1E1-1AED-45C9-ACD5-3100DF9D7791}" type="datetimeFigureOut">
               <a:rPr lang="en-US" smtClean="0"/>
-              <a:t>4/9/2024</a:t>
+              <a:t>4/25/24</a:t>
             </a:fld>
             <a:endParaRPr lang="en-US"/>
           </a:p>
@@ -667,7 +667,7 @@
           <a:p>
             <a:fld id="{CFA7E1E1-1AED-45C9-ACD5-3100DF9D7791}" type="datetimeFigureOut">
               <a:rPr lang="en-US" smtClean="0"/>
-              <a:t>4/9/2024</a:t>
+              <a:t>4/25/24</a:t>
             </a:fld>
             <a:endParaRPr lang="en-US"/>
           </a:p>
@@ -865,7 +865,7 @@
           <a:p>
             <a:fld id="{CFA7E1E1-1AED-45C9-ACD5-3100DF9D7791}" type="datetimeFigureOut">
               <a:rPr lang="en-US" smtClean="0"/>
-              <a:t>4/9/2024</a:t>
+              <a:t>4/25/24</a:t>
             </a:fld>
             <a:endParaRPr lang="en-US"/>
           </a:p>
@@ -1140,7 +1140,7 @@
           <a:p>
             <a:fld id="{CFA7E1E1-1AED-45C9-ACD5-3100DF9D7791}" type="datetimeFigureOut">
               <a:rPr lang="en-US" smtClean="0"/>
-              <a:t>4/9/2024</a:t>
+              <a:t>4/25/24</a:t>
             </a:fld>
             <a:endParaRPr lang="en-US"/>
           </a:p>
@@ -1405,7 +1405,7 @@
           <a:p>
             <a:fld id="{CFA7E1E1-1AED-45C9-ACD5-3100DF9D7791}" type="datetimeFigureOut">
               <a:rPr lang="en-US" smtClean="0"/>
-              <a:t>4/9/2024</a:t>
+              <a:t>4/25/24</a:t>
             </a:fld>
             <a:endParaRPr lang="en-US"/>
           </a:p>
@@ -1817,7 +1817,7 @@
           <a:p>
             <a:fld id="{CFA7E1E1-1AED-45C9-ACD5-3100DF9D7791}" type="datetimeFigureOut">
               <a:rPr lang="en-US" smtClean="0"/>
-              <a:t>4/9/2024</a:t>
+              <a:t>4/25/24</a:t>
             </a:fld>
             <a:endParaRPr lang="en-US"/>
           </a:p>
@@ -1958,7 +1958,7 @@
           <a:p>
             <a:fld id="{CFA7E1E1-1AED-45C9-ACD5-3100DF9D7791}" type="datetimeFigureOut">
               <a:rPr lang="en-US" smtClean="0"/>
-              <a:t>4/9/2024</a:t>
+              <a:t>4/25/24</a:t>
             </a:fld>
             <a:endParaRPr lang="en-US"/>
           </a:p>
@@ -2071,7 +2071,7 @@
           <a:p>
             <a:fld id="{CFA7E1E1-1AED-45C9-ACD5-3100DF9D7791}" type="datetimeFigureOut">
               <a:rPr lang="en-US" smtClean="0"/>
-              <a:t>4/9/2024</a:t>
+              <a:t>4/25/24</a:t>
             </a:fld>
             <a:endParaRPr lang="en-US"/>
           </a:p>
@@ -2382,7 +2382,7 @@
           <a:p>
             <a:fld id="{CFA7E1E1-1AED-45C9-ACD5-3100DF9D7791}" type="datetimeFigureOut">
               <a:rPr lang="en-US" smtClean="0"/>
-              <a:t>4/9/2024</a:t>
+              <a:t>4/25/24</a:t>
             </a:fld>
             <a:endParaRPr lang="en-US"/>
           </a:p>
@@ -2670,7 +2670,7 @@
           <a:p>
             <a:fld id="{CFA7E1E1-1AED-45C9-ACD5-3100DF9D7791}" type="datetimeFigureOut">
               <a:rPr lang="en-US" smtClean="0"/>
-              <a:t>4/9/2024</a:t>
+              <a:t>4/25/24</a:t>
             </a:fld>
             <a:endParaRPr lang="en-US"/>
           </a:p>
@@ -2916,7 +2916,7 @@
           <a:p>
             <a:fld id="{CFA7E1E1-1AED-45C9-ACD5-3100DF9D7791}" type="datetimeFigureOut">
               <a:rPr lang="en-US" smtClean="0"/>
-              <a:t>4/9/2024</a:t>
+              <a:t>4/25/24</a:t>
             </a:fld>
             <a:endParaRPr lang="en-US"/>
           </a:p>
@@ -3694,6 +3694,12 @@
             </a:r>
             <a:r>
               <a:rPr lang="en-US" sz="4000" dirty="0">
+                <a:solidFill>
+                  <a:schemeClr val="tx2">
+                    <a:lumMod val="75000"/>
+                    <a:lumOff val="25000"/>
+                  </a:schemeClr>
+                </a:solidFill>
                 <a:latin typeface="Berlin Sans FB Demi" panose="020E0802020502020306" pitchFamily="34" charset="0"/>
                 <a:cs typeface="Aharoni" panose="02010803020104030203" pitchFamily="2" charset="-79"/>
               </a:rPr>
@@ -3721,6 +3727,12 @@
             </a:r>
             <a:r>
               <a:rPr lang="en-US" sz="4000" dirty="0">
+                <a:solidFill>
+                  <a:schemeClr val="tx2">
+                    <a:lumMod val="75000"/>
+                    <a:lumOff val="25000"/>
+                  </a:schemeClr>
+                </a:solidFill>
                 <a:latin typeface="Berlin Sans FB Demi" panose="020E0802020502020306" pitchFamily="34" charset="0"/>
                 <a:cs typeface="Aharoni" panose="02010803020104030203" pitchFamily="2" charset="-79"/>
               </a:rPr>
@@ -3748,10 +3760,23 @@
             </a:r>
             <a:r>
               <a:rPr lang="en-US" sz="4000" dirty="0">
+                <a:solidFill>
+                  <a:schemeClr val="tx2">
+                    <a:lumMod val="75000"/>
+                    <a:lumOff val="25000"/>
+                  </a:schemeClr>
+                </a:solidFill>
                 <a:latin typeface="Berlin Sans FB Demi" panose="020E0802020502020306" pitchFamily="34" charset="0"/>
                 <a:cs typeface="Aharoni" panose="02010803020104030203" pitchFamily="2" charset="-79"/>
               </a:rPr>
-              <a:t>ata </a:t>
+              <a:t>ata</a:t>
+            </a:r>
+            <a:r>
+              <a:rPr lang="en-US" sz="4000" dirty="0">
+                <a:latin typeface="Berlin Sans FB Demi" panose="020E0802020502020306" pitchFamily="34" charset="0"/>
+                <a:cs typeface="Aharoni" panose="02010803020104030203" pitchFamily="2" charset="-79"/>
+              </a:rPr>
+              <a:t> </a:t>
             </a:r>
             <a:r>
               <a:rPr lang="en-US" sz="4000" dirty="0">
@@ -3765,10 +3790,23 @@
             </a:r>
             <a:r>
               <a:rPr lang="en-US" sz="4000" dirty="0">
+                <a:solidFill>
+                  <a:schemeClr val="tx2">
+                    <a:lumMod val="75000"/>
+                    <a:lumOff val="25000"/>
+                  </a:schemeClr>
+                </a:solidFill>
                 <a:latin typeface="Berlin Sans FB Demi" panose="020E0802020502020306" pitchFamily="34" charset="0"/>
                 <a:cs typeface="Aharoni" panose="02010803020104030203" pitchFamily="2" charset="-79"/>
               </a:rPr>
-              <a:t>anagement </a:t>
+              <a:t>anagement</a:t>
+            </a:r>
+            <a:r>
+              <a:rPr lang="en-US" sz="4000" dirty="0">
+                <a:latin typeface="Berlin Sans FB Demi" panose="020E0802020502020306" pitchFamily="34" charset="0"/>
+                <a:cs typeface="Aharoni" panose="02010803020104030203" pitchFamily="2" charset="-79"/>
+              </a:rPr>
+              <a:t> </a:t>
             </a:r>
             <a:r>
               <a:rPr lang="en-US" sz="4000" dirty="0">
@@ -3778,7 +3816,20 @@
                 <a:latin typeface="Berlin Sans FB Demi" panose="020E0802020502020306" pitchFamily="34" charset="0"/>
                 <a:cs typeface="Aharoni" panose="02010803020104030203" pitchFamily="2" charset="-79"/>
               </a:rPr>
-              <a:t>Glossary</a:t>
+              <a:t>G</a:t>
+            </a:r>
+            <a:r>
+              <a:rPr lang="en-US" sz="4000" dirty="0">
+                <a:solidFill>
+                  <a:schemeClr val="tx2">
+                    <a:lumMod val="75000"/>
+                    <a:lumOff val="25000"/>
+                  </a:schemeClr>
+                </a:solidFill>
+                <a:latin typeface="Berlin Sans FB Demi" panose="020E0802020502020306" pitchFamily="34" charset="0"/>
+                <a:cs typeface="Aharoni" panose="02010803020104030203" pitchFamily="2" charset="-79"/>
+              </a:rPr>
+              <a:t>lossary</a:t>
             </a:r>
           </a:p>
         </p:txBody>

</xml_diff>